<commit_message>
Us east 2a (#10)
* updates

* updates

* updates

* updates

* updates

* updates

* updates

* updates

* updates

* updates

* updates

* updates

* updates

* updates

* api scripts

* updates

* added jupyter json workbook for the TE Api

* updates

* added the scp script

* updates

* updates

* updates

* updates

* updates

* updates

* updates

* updates

* updates

* updates

* updates
</commit_message>
<xml_diff>
--- a/PowerPoint/CISCO FSO CLOUD LAB .pptx
+++ b/PowerPoint/CISCO FSO CLOUD LAB .pptx
@@ -338,7 +338,7 @@
               <a:pPr>
                 <a:defRPr/>
               </a:pPr>
-              <a:t>2/7/22</a:t>
+              <a:t>3/11/22</a:t>
             </a:fld>
             <a:endParaRPr lang="en-US"/>
           </a:p>
@@ -561,7 +561,7 @@
               <a:pPr>
                 <a:defRPr/>
               </a:pPr>
-              <a:t>2/7/22</a:t>
+              <a:t>3/11/22</a:t>
             </a:fld>
             <a:endParaRPr lang="en-US"/>
           </a:p>
@@ -1583,7 +1583,7 @@
               </a14:hiddenLine>
             </a:ext>
             <a:ext uri="{FAA26D3D-D897-4be2-8F04-BA451C77F1D7}">
-              <ma14:placeholderFlag xmlns:ma14="http://schemas.microsoft.com/office/mac/drawingml/2011/main" xmlns="" val="1"/>
+              <ma14:placeholderFlag xmlns="" xmlns:ma14="http://schemas.microsoft.com/office/mac/drawingml/2011/main" val="1"/>
             </a:ext>
           </a:extLst>
         </p:spPr>
@@ -1963,14 +1963,14 @@
           </a:ln>
           <a:extLst>
             <a:ext uri="{909E8E84-426E-40dd-AFC4-6F175D3DCCD1}">
-              <a14:hiddenFill xmlns="" xmlns:a14="http://schemas.microsoft.com/office/drawing/2010/main">
+              <a14:hiddenFill xmlns:a14="http://schemas.microsoft.com/office/drawing/2010/main" xmlns="">
                 <a:solidFill>
                   <a:srgbClr val="FFFFFF"/>
                 </a:solidFill>
               </a14:hiddenFill>
             </a:ext>
             <a:ext uri="{91240B29-F687-4f45-9708-019B960494DF}">
-              <a14:hiddenLine xmlns="" xmlns:a14="http://schemas.microsoft.com/office/drawing/2010/main" w="9525">
+              <a14:hiddenLine xmlns:a14="http://schemas.microsoft.com/office/drawing/2010/main" xmlns="" w="9525">
                 <a:solidFill>
                   <a:srgbClr val="000000"/>
                 </a:solidFill>
@@ -2073,7 +2073,7 @@
               </a14:hiddenLine>
             </a:ext>
             <a:ext uri="{FAA26D3D-D897-4be2-8F04-BA451C77F1D7}">
-              <ma14:placeholderFlag xmlns:ma14="http://schemas.microsoft.com/office/mac/drawingml/2011/main" xmlns="" val="1"/>
+              <ma14:placeholderFlag xmlns="" xmlns:ma14="http://schemas.microsoft.com/office/mac/drawingml/2011/main" val="1"/>
             </a:ext>
           </a:extLst>
         </p:spPr>
@@ -2299,14 +2299,14 @@
           </a:ln>
           <a:extLst>
             <a:ext uri="{909E8E84-426E-40dd-AFC4-6F175D3DCCD1}">
-              <a14:hiddenFill xmlns="" xmlns:a14="http://schemas.microsoft.com/office/drawing/2010/main">
+              <a14:hiddenFill xmlns:a14="http://schemas.microsoft.com/office/drawing/2010/main" xmlns="">
                 <a:solidFill>
                   <a:srgbClr val="FFFFFF"/>
                 </a:solidFill>
               </a14:hiddenFill>
             </a:ext>
             <a:ext uri="{91240B29-F687-4f45-9708-019B960494DF}">
-              <a14:hiddenLine xmlns="" xmlns:a14="http://schemas.microsoft.com/office/drawing/2010/main" w="9525">
+              <a14:hiddenLine xmlns:a14="http://schemas.microsoft.com/office/drawing/2010/main" xmlns="" w="9525">
                 <a:solidFill>
                   <a:srgbClr val="000000"/>
                 </a:solidFill>
@@ -2506,14 +2506,14 @@
           </a:ln>
           <a:extLst>
             <a:ext uri="{909E8E84-426E-40dd-AFC4-6F175D3DCCD1}">
-              <a14:hiddenFill xmlns="" xmlns:a14="http://schemas.microsoft.com/office/drawing/2010/main">
+              <a14:hiddenFill xmlns:a14="http://schemas.microsoft.com/office/drawing/2010/main" xmlns="">
                 <a:solidFill>
                   <a:srgbClr val="FFFFFF"/>
                 </a:solidFill>
               </a14:hiddenFill>
             </a:ext>
             <a:ext uri="{91240B29-F687-4f45-9708-019B960494DF}">
-              <a14:hiddenLine xmlns="" xmlns:a14="http://schemas.microsoft.com/office/drawing/2010/main" w="9525">
+              <a14:hiddenLine xmlns:a14="http://schemas.microsoft.com/office/drawing/2010/main" xmlns="" w="9525">
                 <a:solidFill>
                   <a:srgbClr val="000000"/>
                 </a:solidFill>
@@ -2656,14 +2656,14 @@
           </a:ln>
           <a:extLst>
             <a:ext uri="{909E8E84-426E-40dd-AFC4-6F175D3DCCD1}">
-              <a14:hiddenFill xmlns:a14="http://schemas.microsoft.com/office/drawing/2010/main" xmlns="">
+              <a14:hiddenFill xmlns="" xmlns:a14="http://schemas.microsoft.com/office/drawing/2010/main">
                 <a:solidFill>
                   <a:srgbClr val="FFFFFF"/>
                 </a:solidFill>
               </a14:hiddenFill>
             </a:ext>
             <a:ext uri="{91240B29-F687-4f45-9708-019B960494DF}">
-              <a14:hiddenLine xmlns:a14="http://schemas.microsoft.com/office/drawing/2010/main" xmlns="" w="9525">
+              <a14:hiddenLine xmlns="" xmlns:a14="http://schemas.microsoft.com/office/drawing/2010/main" w="9525">
                 <a:solidFill>
                   <a:srgbClr val="000000"/>
                 </a:solidFill>
@@ -2984,7 +2984,7 @@
               </a14:hiddenLine>
             </a:ext>
             <a:ext uri="{FAA26D3D-D897-4be2-8F04-BA451C77F1D7}">
-              <ma14:placeholderFlag xmlns:ma14="http://schemas.microsoft.com/office/mac/drawingml/2011/main" xmlns="" val="1"/>
+              <ma14:placeholderFlag xmlns="" xmlns:ma14="http://schemas.microsoft.com/office/mac/drawingml/2011/main" val="1"/>
             </a:ext>
           </a:extLst>
         </p:spPr>
@@ -3185,7 +3185,7 @@
           </a:ln>
           <a:extLst>
             <a:ext uri="{FAA26D3D-D897-4be2-8F04-BA451C77F1D7}">
-              <ma14:placeholderFlag xmlns:ma14="http://schemas.microsoft.com/office/mac/drawingml/2011/main" xmlns="" val="1"/>
+              <ma14:placeholderFlag xmlns="" xmlns:ma14="http://schemas.microsoft.com/office/mac/drawingml/2011/main" val="1"/>
             </a:ext>
           </a:extLst>
         </p:spPr>
@@ -3552,7 +3552,7 @@
               </a14:hiddenLine>
             </a:ext>
             <a:ext uri="{FAA26D3D-D897-4be2-8F04-BA451C77F1D7}">
-              <ma14:placeholderFlag xmlns:ma14="http://schemas.microsoft.com/office/mac/drawingml/2011/main" xmlns="" val="1"/>
+              <ma14:placeholderFlag xmlns="" xmlns:ma14="http://schemas.microsoft.com/office/mac/drawingml/2011/main" val="1"/>
             </a:ext>
           </a:extLst>
         </p:spPr>
@@ -4117,7 +4117,7 @@
           </a:ln>
           <a:extLst>
             <a:ext uri="{FAA26D3D-D897-4be2-8F04-BA451C77F1D7}">
-              <ma14:placeholderFlag xmlns:ma14="http://schemas.microsoft.com/office/mac/drawingml/2011/main" xmlns="" val="1"/>
+              <ma14:placeholderFlag xmlns="" xmlns:ma14="http://schemas.microsoft.com/office/mac/drawingml/2011/main" val="1"/>
             </a:ext>
           </a:extLst>
         </p:spPr>
@@ -4415,7 +4415,7 @@
           </a:ln>
           <a:extLst>
             <a:ext uri="{FAA26D3D-D897-4be2-8F04-BA451C77F1D7}">
-              <ma14:placeholderFlag xmlns:ma14="http://schemas.microsoft.com/office/mac/drawingml/2011/main" xmlns="" val="1"/>
+              <ma14:placeholderFlag xmlns="" xmlns:ma14="http://schemas.microsoft.com/office/mac/drawingml/2011/main" val="1"/>
             </a:ext>
           </a:extLst>
         </p:spPr>
@@ -4677,7 +4677,7 @@
           </a:ln>
           <a:extLst>
             <a:ext uri="{FAA26D3D-D897-4be2-8F04-BA451C77F1D7}">
-              <ma14:placeholderFlag xmlns:ma14="http://schemas.microsoft.com/office/mac/drawingml/2011/main" xmlns="" val="1"/>
+              <ma14:placeholderFlag xmlns="" xmlns:ma14="http://schemas.microsoft.com/office/mac/drawingml/2011/main" val="1"/>
             </a:ext>
           </a:extLst>
         </p:spPr>
@@ -4915,7 +4915,7 @@
               </a14:hiddenLine>
             </a:ext>
             <a:ext uri="{FAA26D3D-D897-4be2-8F04-BA451C77F1D7}">
-              <ma14:placeholderFlag xmlns:ma14="http://schemas.microsoft.com/office/mac/drawingml/2011/main" xmlns="" val="1"/>
+              <ma14:placeholderFlag xmlns="" xmlns:ma14="http://schemas.microsoft.com/office/mac/drawingml/2011/main" val="1"/>
             </a:ext>
           </a:extLst>
         </p:spPr>
@@ -5185,7 +5185,7 @@
               </a14:hiddenLine>
             </a:ext>
             <a:ext uri="{FAA26D3D-D897-4be2-8F04-BA451C77F1D7}">
-              <ma14:placeholderFlag xmlns:ma14="http://schemas.microsoft.com/office/mac/drawingml/2011/main" xmlns="" val="1"/>
+              <ma14:placeholderFlag xmlns="" xmlns:ma14="http://schemas.microsoft.com/office/mac/drawingml/2011/main" val="1"/>
             </a:ext>
           </a:extLst>
         </p:spPr>
@@ -5449,7 +5449,7 @@
               </a14:hiddenLine>
             </a:ext>
             <a:ext uri="{FAA26D3D-D897-4be2-8F04-BA451C77F1D7}">
-              <ma14:placeholderFlag xmlns:ma14="http://schemas.microsoft.com/office/mac/drawingml/2011/main" xmlns="" val="1"/>
+              <ma14:placeholderFlag xmlns="" xmlns:ma14="http://schemas.microsoft.com/office/mac/drawingml/2011/main" val="1"/>
             </a:ext>
           </a:extLst>
         </p:spPr>
@@ -6842,7 +6842,7 @@
               </a14:hiddenLine>
             </a:ext>
             <a:ext uri="{FAA26D3D-D897-4be2-8F04-BA451C77F1D7}">
-              <ma14:placeholderFlag xmlns:ma14="http://schemas.microsoft.com/office/mac/drawingml/2011/main" xmlns="" val="1"/>
+              <ma14:placeholderFlag xmlns="" xmlns:ma14="http://schemas.microsoft.com/office/mac/drawingml/2011/main" val="1"/>
             </a:ext>
           </a:extLst>
         </p:spPr>
@@ -18021,8 +18021,8 @@
         </p:nvSpPr>
         <p:spPr>
           <a:xfrm>
-            <a:off x="421967" y="652007"/>
-            <a:ext cx="7585544" cy="4678204"/>
+            <a:off x="421967" y="551207"/>
+            <a:ext cx="7585544" cy="4893647"/>
           </a:xfrm>
           <a:prstGeom prst="rect">
             <a:avLst/>
@@ -18149,6 +18149,14 @@
                 <a:latin typeface="+mn-lt"/>
               </a:rPr>
               <a:t>Configure TE Tests – Console and API 30 min – 1 HR.</a:t>
+            </a:r>
+          </a:p>
+          <a:p>
+            <a:r>
+              <a:rPr lang="en-US" sz="1400" dirty="0">
+                <a:latin typeface="+mn-lt"/>
+              </a:rPr>
+              <a:t>The Winners Gets a Prize!!!!!!!!</a:t>
             </a:r>
           </a:p>
           <a:p>

</xml_diff>